<commit_message>
adding V1 GitHub Collab PDF
</commit_message>
<xml_diff>
--- a/GitHub_Collab.pptx
+++ b/GitHub_Collab.pptx
@@ -10,7 +10,8 @@
     <p:sldId id="258" r:id="rId4"/>
     <p:sldId id="259" r:id="rId5"/>
     <p:sldId id="260" r:id="rId6"/>
-    <p:sldId id="261" r:id="rId7"/>
+    <p:sldId id="262" r:id="rId7"/>
+    <p:sldId id="261" r:id="rId8"/>
   </p:sldIdLst>
   <p:sldSz cx="12192000" cy="6858000"/>
   <p:notesSz cx="6858000" cy="9144000"/>
@@ -109,6 +110,11 @@
       </a:defRPr>
     </a:lvl9pPr>
   </p:defaultTextStyle>
+  <p:extLst>
+    <p:ext uri="{EFAFB233-063F-42B5-8137-9DF3F51BA10A}">
+      <p15:sldGuideLst xmlns:p15="http://schemas.microsoft.com/office/powerpoint/2012/main"/>
+    </p:ext>
+  </p:extLst>
 </p:presentation>
 </file>
 
@@ -4318,15 +4324,7 @@
           <a:p>
             <a:r>
               <a:rPr lang="en-US" dirty="0"/>
-              <a:t>	Notice the * … we are now in “</a:t>
-            </a:r>
-            <a:r>
-              <a:rPr lang="en-US" dirty="0" err="1"/>
-              <a:t>DevBranch</a:t>
-            </a:r>
-            <a:r>
-              <a:rPr lang="en-US" dirty="0"/>
-              <a:t>”</a:t>
+              <a:t>	Notice the * … we are now in “DevBranch”</a:t>
             </a:r>
           </a:p>
         </p:txBody>
@@ -4375,8 +4373,8 @@
         </p:nvSpPr>
         <p:spPr>
           <a:xfrm>
-            <a:off x="2686050" y="2331720"/>
-            <a:ext cx="9505950" cy="1157368"/>
+            <a:off x="2686050" y="2766060"/>
+            <a:ext cx="9505950" cy="1572866"/>
           </a:xfrm>
           <a:prstGeom prst="rect">
             <a:avLst/>
@@ -4416,6 +4414,17 @@
               <a:t>Therefore, our local repo is different than the (shared) remote repo</a:t>
             </a:r>
           </a:p>
+          <a:p>
+            <a:pPr>
+              <a:lnSpc>
+                <a:spcPct val="150000"/>
+              </a:lnSpc>
+            </a:pPr>
+            <a:r>
+              <a:rPr lang="en-US" dirty="0"/>
+              <a:t>We want the changes on our local repo applied to the “remote” repo (the one we are sharing)</a:t>
+            </a:r>
+          </a:p>
         </p:txBody>
       </p:sp>
       <p:sp>
@@ -4508,6 +4517,214 @@
             <a:r>
               <a:rPr lang="en-US" dirty="0"/>
               <a:t>remote repo</a:t>
+            </a:r>
+          </a:p>
+        </p:txBody>
+      </p:sp>
+      <p:pic>
+        <p:nvPicPr>
+          <p:cNvPr id="5" name="Picture 4">
+            <a:extLst>
+              <a:ext uri="{FF2B5EF4-FFF2-40B4-BE49-F238E27FC236}">
+                <a16:creationId xmlns:a16="http://schemas.microsoft.com/office/drawing/2014/main" id="{5B47D0AC-7F23-4726-B6AA-CB14B2CD6385}"/>
+              </a:ext>
+            </a:extLst>
+          </p:cNvPr>
+          <p:cNvPicPr>
+            <a:picLocks noChangeAspect="1"/>
+          </p:cNvPicPr>
+          <p:nvPr/>
+        </p:nvPicPr>
+        <p:blipFill>
+          <a:blip r:embed="rId2"/>
+          <a:stretch>
+            <a:fillRect/>
+          </a:stretch>
+        </p:blipFill>
+        <p:spPr>
+          <a:xfrm>
+            <a:off x="361950" y="631210"/>
+            <a:ext cx="6461759" cy="1833396"/>
+          </a:xfrm>
+          <a:prstGeom prst="rect">
+            <a:avLst/>
+          </a:prstGeom>
+        </p:spPr>
+      </p:pic>
+      <p:sp>
+        <p:nvSpPr>
+          <p:cNvPr id="6" name="Rectangle 5">
+            <a:extLst>
+              <a:ext uri="{FF2B5EF4-FFF2-40B4-BE49-F238E27FC236}">
+                <a16:creationId xmlns:a16="http://schemas.microsoft.com/office/drawing/2014/main" id="{10C025F0-5A5A-448F-8ECB-598B898842F6}"/>
+              </a:ext>
+            </a:extLst>
+          </p:cNvPr>
+          <p:cNvSpPr/>
+          <p:nvPr/>
+        </p:nvSpPr>
+        <p:spPr>
+          <a:xfrm>
+            <a:off x="251460" y="857249"/>
+            <a:ext cx="1668780" cy="262891"/>
+          </a:xfrm>
+          <a:prstGeom prst="rect">
+            <a:avLst/>
+          </a:prstGeom>
+          <a:noFill/>
+          <a:ln>
+            <a:solidFill>
+              <a:srgbClr val="FF0000"/>
+            </a:solidFill>
+          </a:ln>
+        </p:spPr>
+        <p:style>
+          <a:lnRef idx="2">
+            <a:schemeClr val="accent1">
+              <a:shade val="50000"/>
+            </a:schemeClr>
+          </a:lnRef>
+          <a:fillRef idx="1">
+            <a:schemeClr val="accent1"/>
+          </a:fillRef>
+          <a:effectRef idx="0">
+            <a:schemeClr val="accent1"/>
+          </a:effectRef>
+          <a:fontRef idx="minor">
+            <a:schemeClr val="lt1"/>
+          </a:fontRef>
+        </p:style>
+        <p:txBody>
+          <a:bodyPr rtlCol="0" anchor="ctr"/>
+          <a:lstStyle/>
+          <a:p>
+            <a:pPr algn="ctr"/>
+            <a:endParaRPr lang="en-US"/>
+          </a:p>
+        </p:txBody>
+      </p:sp>
+      <p:sp>
+        <p:nvSpPr>
+          <p:cNvPr id="7" name="Rectangle 6">
+            <a:extLst>
+              <a:ext uri="{FF2B5EF4-FFF2-40B4-BE49-F238E27FC236}">
+                <a16:creationId xmlns:a16="http://schemas.microsoft.com/office/drawing/2014/main" id="{76324487-2922-42E4-8892-153B7F329E1C}"/>
+              </a:ext>
+            </a:extLst>
+          </p:cNvPr>
+          <p:cNvSpPr/>
+          <p:nvPr/>
+        </p:nvSpPr>
+        <p:spPr>
+          <a:xfrm>
+            <a:off x="251460" y="1392323"/>
+            <a:ext cx="4114799" cy="400050"/>
+          </a:xfrm>
+          <a:prstGeom prst="rect">
+            <a:avLst/>
+          </a:prstGeom>
+          <a:noFill/>
+          <a:ln>
+            <a:solidFill>
+              <a:srgbClr val="FF0000"/>
+            </a:solidFill>
+          </a:ln>
+        </p:spPr>
+        <p:style>
+          <a:lnRef idx="2">
+            <a:schemeClr val="accent1">
+              <a:shade val="50000"/>
+            </a:schemeClr>
+          </a:lnRef>
+          <a:fillRef idx="1">
+            <a:schemeClr val="accent1"/>
+          </a:fillRef>
+          <a:effectRef idx="0">
+            <a:schemeClr val="accent1"/>
+          </a:effectRef>
+          <a:fontRef idx="minor">
+            <a:schemeClr val="lt1"/>
+          </a:fontRef>
+        </p:style>
+        <p:txBody>
+          <a:bodyPr rtlCol="0" anchor="ctr"/>
+          <a:lstStyle/>
+          <a:p>
+            <a:pPr algn="ctr"/>
+            <a:endParaRPr lang="en-US"/>
+          </a:p>
+        </p:txBody>
+      </p:sp>
+      <p:pic>
+        <p:nvPicPr>
+          <p:cNvPr id="8" name="Picture 7">
+            <a:extLst>
+              <a:ext uri="{FF2B5EF4-FFF2-40B4-BE49-F238E27FC236}">
+                <a16:creationId xmlns:a16="http://schemas.microsoft.com/office/drawing/2014/main" id="{8C79CA69-2C6E-4659-BB0A-63E367A62B14}"/>
+              </a:ext>
+            </a:extLst>
+          </p:cNvPr>
+          <p:cNvPicPr>
+            <a:picLocks noChangeAspect="1"/>
+          </p:cNvPicPr>
+          <p:nvPr/>
+        </p:nvPicPr>
+        <p:blipFill>
+          <a:blip r:embed="rId3"/>
+          <a:stretch>
+            <a:fillRect/>
+          </a:stretch>
+        </p:blipFill>
+        <p:spPr>
+          <a:xfrm>
+            <a:off x="323849" y="4748369"/>
+            <a:ext cx="6589597" cy="1833396"/>
+          </a:xfrm>
+          <a:prstGeom prst="rect">
+            <a:avLst/>
+          </a:prstGeom>
+        </p:spPr>
+      </p:pic>
+      <p:sp>
+        <p:nvSpPr>
+          <p:cNvPr id="9" name="TextBox 8">
+            <a:extLst>
+              <a:ext uri="{FF2B5EF4-FFF2-40B4-BE49-F238E27FC236}">
+                <a16:creationId xmlns:a16="http://schemas.microsoft.com/office/drawing/2014/main" id="{91C21F99-8A20-441B-AE86-A7ABB80A5A46}"/>
+              </a:ext>
+            </a:extLst>
+          </p:cNvPr>
+          <p:cNvSpPr txBox="1"/>
+          <p:nvPr/>
+        </p:nvSpPr>
+        <p:spPr>
+          <a:xfrm>
+            <a:off x="7029450" y="4748369"/>
+            <a:ext cx="4594860" cy="1477328"/>
+          </a:xfrm>
+          <a:prstGeom prst="rect">
+            <a:avLst/>
+          </a:prstGeom>
+          <a:noFill/>
+        </p:spPr>
+        <p:txBody>
+          <a:bodyPr wrap="square" rtlCol="0">
+            <a:spAutoFit/>
+          </a:bodyPr>
+          <a:lstStyle/>
+          <a:p>
+            <a:r>
+              <a:rPr lang="en-US" dirty="0"/>
+              <a:t>Each commit has a sha#.  Here I can see my commit “in progress PDF” but, </a:t>
+            </a:r>
+          </a:p>
+          <a:p>
+            <a:endParaRPr lang="en-US" dirty="0"/>
+          </a:p>
+          <a:p>
+            <a:r>
+              <a:rPr lang="en-US" dirty="0"/>
+              <a:t>I can also see all of the commits that were made before me</a:t>
             </a:r>
           </a:p>
         </p:txBody>
@@ -4542,6 +4759,159 @@
           <a:chExt cx="0" cy="0"/>
         </a:xfrm>
       </p:grpSpPr>
+      <p:pic>
+        <p:nvPicPr>
+          <p:cNvPr id="2" name="Picture 1">
+            <a:extLst>
+              <a:ext uri="{FF2B5EF4-FFF2-40B4-BE49-F238E27FC236}">
+                <a16:creationId xmlns:a16="http://schemas.microsoft.com/office/drawing/2014/main" id="{8F3BBC8F-42CE-4649-9CB9-579D9250ED25}"/>
+              </a:ext>
+            </a:extLst>
+          </p:cNvPr>
+          <p:cNvPicPr>
+            <a:picLocks noChangeAspect="1"/>
+          </p:cNvPicPr>
+          <p:nvPr/>
+        </p:nvPicPr>
+        <p:blipFill>
+          <a:blip r:embed="rId2"/>
+          <a:stretch>
+            <a:fillRect/>
+          </a:stretch>
+        </p:blipFill>
+        <p:spPr>
+          <a:xfrm>
+            <a:off x="98886" y="2486024"/>
+            <a:ext cx="12093114" cy="3526416"/>
+          </a:xfrm>
+          <a:prstGeom prst="rect">
+            <a:avLst/>
+          </a:prstGeom>
+        </p:spPr>
+      </p:pic>
+      <p:sp>
+        <p:nvSpPr>
+          <p:cNvPr id="3" name="TextBox 2">
+            <a:extLst>
+              <a:ext uri="{FF2B5EF4-FFF2-40B4-BE49-F238E27FC236}">
+                <a16:creationId xmlns:a16="http://schemas.microsoft.com/office/drawing/2014/main" id="{AA1CEBF7-D602-43BA-8E9F-3524DDF01132}"/>
+              </a:ext>
+            </a:extLst>
+          </p:cNvPr>
+          <p:cNvSpPr txBox="1"/>
+          <p:nvPr/>
+        </p:nvSpPr>
+        <p:spPr>
+          <a:xfrm>
+            <a:off x="0" y="0"/>
+            <a:ext cx="10241280" cy="523220"/>
+          </a:xfrm>
+          <a:prstGeom prst="rect">
+            <a:avLst/>
+          </a:prstGeom>
+          <a:noFill/>
+        </p:spPr>
+        <p:txBody>
+          <a:bodyPr wrap="square" rtlCol="0">
+            <a:spAutoFit/>
+          </a:bodyPr>
+          <a:lstStyle/>
+          <a:p>
+            <a:r>
+              <a:rPr lang="en-US" sz="2800" b="1" dirty="0"/>
+              <a:t>Push the staged changes to the remote repo</a:t>
+            </a:r>
+            <a:endParaRPr lang="en-US" dirty="0"/>
+          </a:p>
+        </p:txBody>
+      </p:sp>
+      <p:sp>
+        <p:nvSpPr>
+          <p:cNvPr id="4" name="Rectangle 3">
+            <a:extLst>
+              <a:ext uri="{FF2B5EF4-FFF2-40B4-BE49-F238E27FC236}">
+                <a16:creationId xmlns:a16="http://schemas.microsoft.com/office/drawing/2014/main" id="{2BDE093F-382B-4FD4-8098-F6B4909F2CC8}"/>
+              </a:ext>
+            </a:extLst>
+          </p:cNvPr>
+          <p:cNvSpPr/>
+          <p:nvPr/>
+        </p:nvSpPr>
+        <p:spPr>
+          <a:xfrm>
+            <a:off x="-160020" y="2798213"/>
+            <a:ext cx="5040630" cy="400050"/>
+          </a:xfrm>
+          <a:prstGeom prst="rect">
+            <a:avLst/>
+          </a:prstGeom>
+          <a:noFill/>
+          <a:ln>
+            <a:solidFill>
+              <a:srgbClr val="FF0000"/>
+            </a:solidFill>
+          </a:ln>
+        </p:spPr>
+        <p:style>
+          <a:lnRef idx="2">
+            <a:schemeClr val="accent1">
+              <a:shade val="50000"/>
+            </a:schemeClr>
+          </a:lnRef>
+          <a:fillRef idx="1">
+            <a:schemeClr val="accent1"/>
+          </a:fillRef>
+          <a:effectRef idx="0">
+            <a:schemeClr val="accent1"/>
+          </a:effectRef>
+          <a:fontRef idx="minor">
+            <a:schemeClr val="lt1"/>
+          </a:fontRef>
+        </p:style>
+        <p:txBody>
+          <a:bodyPr rtlCol="0" anchor="ctr"/>
+          <a:lstStyle/>
+          <a:p>
+            <a:pPr algn="ctr"/>
+            <a:endParaRPr lang="en-US"/>
+          </a:p>
+        </p:txBody>
+      </p:sp>
+      <p:sp>
+        <p:nvSpPr>
+          <p:cNvPr id="5" name="TextBox 4">
+            <a:extLst>
+              <a:ext uri="{FF2B5EF4-FFF2-40B4-BE49-F238E27FC236}">
+                <a16:creationId xmlns:a16="http://schemas.microsoft.com/office/drawing/2014/main" id="{02777FE4-54AA-42DF-8D67-D8FDE9CA6819}"/>
+              </a:ext>
+            </a:extLst>
+          </p:cNvPr>
+          <p:cNvSpPr txBox="1"/>
+          <p:nvPr/>
+        </p:nvSpPr>
+        <p:spPr>
+          <a:xfrm>
+            <a:off x="586740" y="1625813"/>
+            <a:ext cx="11018520" cy="369332"/>
+          </a:xfrm>
+          <a:prstGeom prst="rect">
+            <a:avLst/>
+          </a:prstGeom>
+          <a:noFill/>
+        </p:spPr>
+        <p:txBody>
+          <a:bodyPr wrap="square" rtlCol="0">
+            <a:spAutoFit/>
+          </a:bodyPr>
+          <a:lstStyle/>
+          <a:p>
+            <a:r>
+              <a:rPr lang="en-US" dirty="0"/>
+              <a:t>I am pushing my local changes from my  “DevBranch”.  This should now exist on the github.com site</a:t>
+            </a:r>
+          </a:p>
+        </p:txBody>
+      </p:sp>
     </p:spTree>
     <p:extLst>
       <p:ext uri="{BB962C8B-B14F-4D97-AF65-F5344CB8AC3E}">
@@ -4572,6 +4942,555 @@
           <a:chExt cx="0" cy="0"/>
         </a:xfrm>
       </p:grpSpPr>
+      <p:pic>
+        <p:nvPicPr>
+          <p:cNvPr id="2" name="Picture 1">
+            <a:extLst>
+              <a:ext uri="{FF2B5EF4-FFF2-40B4-BE49-F238E27FC236}">
+                <a16:creationId xmlns:a16="http://schemas.microsoft.com/office/drawing/2014/main" id="{3A0FB0D1-4532-4691-A524-47C59A7B1A7E}"/>
+              </a:ext>
+            </a:extLst>
+          </p:cNvPr>
+          <p:cNvPicPr>
+            <a:picLocks noChangeAspect="1"/>
+          </p:cNvPicPr>
+          <p:nvPr/>
+        </p:nvPicPr>
+        <p:blipFill>
+          <a:blip r:embed="rId2"/>
+          <a:stretch>
+            <a:fillRect/>
+          </a:stretch>
+        </p:blipFill>
+        <p:spPr>
+          <a:xfrm>
+            <a:off x="0" y="145732"/>
+            <a:ext cx="7886700" cy="1285875"/>
+          </a:xfrm>
+          <a:prstGeom prst="rect">
+            <a:avLst/>
+          </a:prstGeom>
+        </p:spPr>
+      </p:pic>
+      <p:pic>
+        <p:nvPicPr>
+          <p:cNvPr id="5" name="Picture 4">
+            <a:extLst>
+              <a:ext uri="{FF2B5EF4-FFF2-40B4-BE49-F238E27FC236}">
+                <a16:creationId xmlns:a16="http://schemas.microsoft.com/office/drawing/2014/main" id="{61259A14-5C9F-401C-8E24-06E66E4649CC}"/>
+              </a:ext>
+            </a:extLst>
+          </p:cNvPr>
+          <p:cNvPicPr>
+            <a:picLocks noChangeAspect="1"/>
+          </p:cNvPicPr>
+          <p:nvPr/>
+        </p:nvPicPr>
+        <p:blipFill>
+          <a:blip r:embed="rId3"/>
+          <a:stretch>
+            <a:fillRect/>
+          </a:stretch>
+        </p:blipFill>
+        <p:spPr>
+          <a:xfrm>
+            <a:off x="4612957" y="1644968"/>
+            <a:ext cx="7058025" cy="5067300"/>
+          </a:xfrm>
+          <a:prstGeom prst="rect">
+            <a:avLst/>
+          </a:prstGeom>
+        </p:spPr>
+      </p:pic>
+      <p:sp>
+        <p:nvSpPr>
+          <p:cNvPr id="6" name="Rectangle 5">
+            <a:extLst>
+              <a:ext uri="{FF2B5EF4-FFF2-40B4-BE49-F238E27FC236}">
+                <a16:creationId xmlns:a16="http://schemas.microsoft.com/office/drawing/2014/main" id="{4670BFCF-2C79-496C-896A-7692D05DA207}"/>
+              </a:ext>
+            </a:extLst>
+          </p:cNvPr>
+          <p:cNvSpPr/>
+          <p:nvPr/>
+        </p:nvSpPr>
+        <p:spPr>
+          <a:xfrm>
+            <a:off x="6217920" y="788669"/>
+            <a:ext cx="1668780" cy="548641"/>
+          </a:xfrm>
+          <a:prstGeom prst="rect">
+            <a:avLst/>
+          </a:prstGeom>
+          <a:noFill/>
+          <a:ln>
+            <a:solidFill>
+              <a:srgbClr val="FF0000"/>
+            </a:solidFill>
+          </a:ln>
+        </p:spPr>
+        <p:style>
+          <a:lnRef idx="2">
+            <a:schemeClr val="accent1">
+              <a:shade val="50000"/>
+            </a:schemeClr>
+          </a:lnRef>
+          <a:fillRef idx="1">
+            <a:schemeClr val="accent1"/>
+          </a:fillRef>
+          <a:effectRef idx="0">
+            <a:schemeClr val="accent1"/>
+          </a:effectRef>
+          <a:fontRef idx="minor">
+            <a:schemeClr val="lt1"/>
+          </a:fontRef>
+        </p:style>
+        <p:txBody>
+          <a:bodyPr rtlCol="0" anchor="ctr"/>
+          <a:lstStyle/>
+          <a:p>
+            <a:pPr algn="ctr"/>
+            <a:endParaRPr lang="en-US"/>
+          </a:p>
+        </p:txBody>
+      </p:sp>
+      <p:sp>
+        <p:nvSpPr>
+          <p:cNvPr id="7" name="Rectangle 6">
+            <a:extLst>
+              <a:ext uri="{FF2B5EF4-FFF2-40B4-BE49-F238E27FC236}">
+                <a16:creationId xmlns:a16="http://schemas.microsoft.com/office/drawing/2014/main" id="{EF1E3288-2D75-4601-AC4C-9610D0EEFF8B}"/>
+              </a:ext>
+            </a:extLst>
+          </p:cNvPr>
+          <p:cNvSpPr/>
+          <p:nvPr/>
+        </p:nvSpPr>
+        <p:spPr>
+          <a:xfrm>
+            <a:off x="9479280" y="6038849"/>
+            <a:ext cx="2191702" cy="673419"/>
+          </a:xfrm>
+          <a:prstGeom prst="rect">
+            <a:avLst/>
+          </a:prstGeom>
+          <a:noFill/>
+          <a:ln>
+            <a:solidFill>
+              <a:srgbClr val="FF0000"/>
+            </a:solidFill>
+          </a:ln>
+        </p:spPr>
+        <p:style>
+          <a:lnRef idx="2">
+            <a:schemeClr val="accent1">
+              <a:shade val="50000"/>
+            </a:schemeClr>
+          </a:lnRef>
+          <a:fillRef idx="1">
+            <a:schemeClr val="accent1"/>
+          </a:fillRef>
+          <a:effectRef idx="0">
+            <a:schemeClr val="accent1"/>
+          </a:effectRef>
+          <a:fontRef idx="minor">
+            <a:schemeClr val="lt1"/>
+          </a:fontRef>
+        </p:style>
+        <p:txBody>
+          <a:bodyPr rtlCol="0" anchor="ctr"/>
+          <a:lstStyle/>
+          <a:p>
+            <a:pPr algn="ctr"/>
+            <a:endParaRPr lang="en-US"/>
+          </a:p>
+        </p:txBody>
+      </p:sp>
+    </p:spTree>
+    <p:extLst>
+      <p:ext uri="{BB962C8B-B14F-4D97-AF65-F5344CB8AC3E}">
+        <p14:creationId xmlns:p14="http://schemas.microsoft.com/office/powerpoint/2010/main" val="2905550272"/>
+      </p:ext>
+    </p:extLst>
+  </p:cSld>
+  <p:clrMapOvr>
+    <a:masterClrMapping/>
+  </p:clrMapOvr>
+</p:sld>
+</file>
+
+<file path=ppt/slides/slide7.xml><?xml version="1.0" encoding="utf-8"?>
+<p:sld xmlns:a="http://schemas.openxmlformats.org/drawingml/2006/main" xmlns:r="http://schemas.openxmlformats.org/officeDocument/2006/relationships" xmlns:p="http://schemas.openxmlformats.org/presentationml/2006/main">
+  <p:cSld>
+    <p:spTree>
+      <p:nvGrpSpPr>
+        <p:cNvPr id="1" name=""/>
+        <p:cNvGrpSpPr/>
+        <p:nvPr/>
+      </p:nvGrpSpPr>
+      <p:grpSpPr>
+        <a:xfrm>
+          <a:off x="0" y="0"/>
+          <a:ext cx="0" cy="0"/>
+          <a:chOff x="0" y="0"/>
+          <a:chExt cx="0" cy="0"/>
+        </a:xfrm>
+      </p:grpSpPr>
+      <p:pic>
+        <p:nvPicPr>
+          <p:cNvPr id="3" name="Picture 2">
+            <a:extLst>
+              <a:ext uri="{FF2B5EF4-FFF2-40B4-BE49-F238E27FC236}">
+                <a16:creationId xmlns:a16="http://schemas.microsoft.com/office/drawing/2014/main" id="{33426671-04A8-4AA8-B995-2CC6D9A17BBF}"/>
+              </a:ext>
+            </a:extLst>
+          </p:cNvPr>
+          <p:cNvPicPr>
+            <a:picLocks noChangeAspect="1"/>
+          </p:cNvPicPr>
+          <p:nvPr/>
+        </p:nvPicPr>
+        <p:blipFill>
+          <a:blip r:embed="rId2"/>
+          <a:stretch>
+            <a:fillRect/>
+          </a:stretch>
+        </p:blipFill>
+        <p:spPr>
+          <a:xfrm>
+            <a:off x="304800" y="162878"/>
+            <a:ext cx="6153143" cy="4444836"/>
+          </a:xfrm>
+          <a:prstGeom prst="rect">
+            <a:avLst/>
+          </a:prstGeom>
+        </p:spPr>
+      </p:pic>
+      <p:cxnSp>
+        <p:nvCxnSpPr>
+          <p:cNvPr id="5" name="Straight Arrow Connector 4">
+            <a:extLst>
+              <a:ext uri="{FF2B5EF4-FFF2-40B4-BE49-F238E27FC236}">
+                <a16:creationId xmlns:a16="http://schemas.microsoft.com/office/drawing/2014/main" id="{263C6D97-B4C9-47D0-A0BA-214D19A7699F}"/>
+              </a:ext>
+            </a:extLst>
+          </p:cNvPr>
+          <p:cNvCxnSpPr/>
+          <p:nvPr/>
+        </p:nvCxnSpPr>
+        <p:spPr>
+          <a:xfrm flipV="1">
+            <a:off x="6815137" y="525780"/>
+            <a:ext cx="0" cy="3291840"/>
+          </a:xfrm>
+          <a:prstGeom prst="straightConnector1">
+            <a:avLst/>
+          </a:prstGeom>
+          <a:ln>
+            <a:tailEnd type="triangle"/>
+          </a:ln>
+        </p:spPr>
+        <p:style>
+          <a:lnRef idx="1">
+            <a:schemeClr val="accent1"/>
+          </a:lnRef>
+          <a:fillRef idx="0">
+            <a:schemeClr val="accent1"/>
+          </a:fillRef>
+          <a:effectRef idx="0">
+            <a:schemeClr val="accent1"/>
+          </a:effectRef>
+          <a:fontRef idx="minor">
+            <a:schemeClr val="tx1"/>
+          </a:fontRef>
+        </p:style>
+      </p:cxnSp>
+      <p:sp>
+        <p:nvSpPr>
+          <p:cNvPr id="6" name="TextBox 5">
+            <a:extLst>
+              <a:ext uri="{FF2B5EF4-FFF2-40B4-BE49-F238E27FC236}">
+                <a16:creationId xmlns:a16="http://schemas.microsoft.com/office/drawing/2014/main" id="{FFEBEAFF-8491-4E5F-9A1B-368EB8AC8979}"/>
+              </a:ext>
+            </a:extLst>
+          </p:cNvPr>
+          <p:cNvSpPr txBox="1"/>
+          <p:nvPr/>
+        </p:nvSpPr>
+        <p:spPr>
+          <a:xfrm>
+            <a:off x="8206740" y="891540"/>
+            <a:ext cx="3783326" cy="369332"/>
+          </a:xfrm>
+          <a:prstGeom prst="rect">
+            <a:avLst/>
+          </a:prstGeom>
+          <a:noFill/>
+        </p:spPr>
+        <p:txBody>
+          <a:bodyPr wrap="square" rtlCol="0">
+            <a:spAutoFit/>
+          </a:bodyPr>
+          <a:lstStyle/>
+          <a:p>
+            <a:r>
+              <a:rPr lang="en-US" dirty="0"/>
+              <a:t>This is just a timeline of comments</a:t>
+            </a:r>
+          </a:p>
+        </p:txBody>
+      </p:sp>
+      <p:sp>
+        <p:nvSpPr>
+          <p:cNvPr id="7" name="Rectangle 6">
+            <a:extLst>
+              <a:ext uri="{FF2B5EF4-FFF2-40B4-BE49-F238E27FC236}">
+                <a16:creationId xmlns:a16="http://schemas.microsoft.com/office/drawing/2014/main" id="{70EC7032-DDCD-48B1-A927-9A2D233987E4}"/>
+              </a:ext>
+            </a:extLst>
+          </p:cNvPr>
+          <p:cNvSpPr/>
+          <p:nvPr/>
+        </p:nvSpPr>
+        <p:spPr>
+          <a:xfrm>
+            <a:off x="811530" y="3893103"/>
+            <a:ext cx="2191702" cy="673419"/>
+          </a:xfrm>
+          <a:prstGeom prst="rect">
+            <a:avLst/>
+          </a:prstGeom>
+          <a:noFill/>
+          <a:ln>
+            <a:solidFill>
+              <a:srgbClr val="FF0000"/>
+            </a:solidFill>
+          </a:ln>
+        </p:spPr>
+        <p:style>
+          <a:lnRef idx="2">
+            <a:schemeClr val="accent1">
+              <a:shade val="50000"/>
+            </a:schemeClr>
+          </a:lnRef>
+          <a:fillRef idx="1">
+            <a:schemeClr val="accent1"/>
+          </a:fillRef>
+          <a:effectRef idx="0">
+            <a:schemeClr val="accent1"/>
+          </a:effectRef>
+          <a:fontRef idx="minor">
+            <a:schemeClr val="lt1"/>
+          </a:fontRef>
+        </p:style>
+        <p:txBody>
+          <a:bodyPr rtlCol="0" anchor="ctr"/>
+          <a:lstStyle/>
+          <a:p>
+            <a:pPr algn="ctr"/>
+            <a:endParaRPr lang="en-US"/>
+          </a:p>
+        </p:txBody>
+      </p:sp>
+      <p:pic>
+        <p:nvPicPr>
+          <p:cNvPr id="8" name="Picture 7">
+            <a:extLst>
+              <a:ext uri="{FF2B5EF4-FFF2-40B4-BE49-F238E27FC236}">
+                <a16:creationId xmlns:a16="http://schemas.microsoft.com/office/drawing/2014/main" id="{928E5DF3-B0EB-4DF2-8D05-01A5F7B0FA2B}"/>
+              </a:ext>
+            </a:extLst>
+          </p:cNvPr>
+          <p:cNvPicPr>
+            <a:picLocks noChangeAspect="1"/>
+          </p:cNvPicPr>
+          <p:nvPr/>
+        </p:nvPicPr>
+        <p:blipFill>
+          <a:blip r:embed="rId3"/>
+          <a:stretch>
+            <a:fillRect/>
+          </a:stretch>
+        </p:blipFill>
+        <p:spPr>
+          <a:xfrm>
+            <a:off x="628650" y="4826318"/>
+            <a:ext cx="2457450" cy="1400175"/>
+          </a:xfrm>
+          <a:prstGeom prst="rect">
+            <a:avLst/>
+          </a:prstGeom>
+        </p:spPr>
+      </p:pic>
+      <p:sp>
+        <p:nvSpPr>
+          <p:cNvPr id="9" name="Rectangle 8">
+            <a:extLst>
+              <a:ext uri="{FF2B5EF4-FFF2-40B4-BE49-F238E27FC236}">
+                <a16:creationId xmlns:a16="http://schemas.microsoft.com/office/drawing/2014/main" id="{9F98D285-694A-4DCC-AEBF-0E2BBFC1AAAA}"/>
+              </a:ext>
+            </a:extLst>
+          </p:cNvPr>
+          <p:cNvSpPr/>
+          <p:nvPr/>
+        </p:nvSpPr>
+        <p:spPr>
+          <a:xfrm>
+            <a:off x="121920" y="5595936"/>
+            <a:ext cx="2191702" cy="673419"/>
+          </a:xfrm>
+          <a:prstGeom prst="rect">
+            <a:avLst/>
+          </a:prstGeom>
+          <a:noFill/>
+          <a:ln>
+            <a:solidFill>
+              <a:srgbClr val="FF0000"/>
+            </a:solidFill>
+          </a:ln>
+        </p:spPr>
+        <p:style>
+          <a:lnRef idx="2">
+            <a:schemeClr val="accent1">
+              <a:shade val="50000"/>
+            </a:schemeClr>
+          </a:lnRef>
+          <a:fillRef idx="1">
+            <a:schemeClr val="accent1"/>
+          </a:fillRef>
+          <a:effectRef idx="0">
+            <a:schemeClr val="accent1"/>
+          </a:effectRef>
+          <a:fontRef idx="minor">
+            <a:schemeClr val="lt1"/>
+          </a:fontRef>
+        </p:style>
+        <p:txBody>
+          <a:bodyPr rtlCol="0" anchor="ctr"/>
+          <a:lstStyle/>
+          <a:p>
+            <a:pPr algn="ctr"/>
+            <a:endParaRPr lang="en-US"/>
+          </a:p>
+        </p:txBody>
+      </p:sp>
+      <p:pic>
+        <p:nvPicPr>
+          <p:cNvPr id="10" name="Picture 9">
+            <a:extLst>
+              <a:ext uri="{FF2B5EF4-FFF2-40B4-BE49-F238E27FC236}">
+                <a16:creationId xmlns:a16="http://schemas.microsoft.com/office/drawing/2014/main" id="{89D27458-2180-4A18-B0B6-E103E53E3E57}"/>
+              </a:ext>
+            </a:extLst>
+          </p:cNvPr>
+          <p:cNvPicPr>
+            <a:picLocks noChangeAspect="1"/>
+          </p:cNvPicPr>
+          <p:nvPr/>
+        </p:nvPicPr>
+        <p:blipFill>
+          <a:blip r:embed="rId4"/>
+          <a:stretch>
+            <a:fillRect/>
+          </a:stretch>
+        </p:blipFill>
+        <p:spPr>
+          <a:xfrm>
+            <a:off x="4083367" y="5418295"/>
+            <a:ext cx="7362825" cy="1028700"/>
+          </a:xfrm>
+          <a:prstGeom prst="rect">
+            <a:avLst/>
+          </a:prstGeom>
+        </p:spPr>
+      </p:pic>
+      <p:sp>
+        <p:nvSpPr>
+          <p:cNvPr id="11" name="TextBox 10">
+            <a:extLst>
+              <a:ext uri="{FF2B5EF4-FFF2-40B4-BE49-F238E27FC236}">
+                <a16:creationId xmlns:a16="http://schemas.microsoft.com/office/drawing/2014/main" id="{BEE65B76-1024-49A9-9E68-956351E989BB}"/>
+              </a:ext>
+            </a:extLst>
+          </p:cNvPr>
+          <p:cNvSpPr txBox="1"/>
+          <p:nvPr/>
+        </p:nvSpPr>
+        <p:spPr>
+          <a:xfrm>
+            <a:off x="8709660" y="4779820"/>
+            <a:ext cx="3280406" cy="646331"/>
+          </a:xfrm>
+          <a:prstGeom prst="rect">
+            <a:avLst/>
+          </a:prstGeom>
+          <a:noFill/>
+        </p:spPr>
+        <p:txBody>
+          <a:bodyPr wrap="square" rtlCol="0">
+            <a:spAutoFit/>
+          </a:bodyPr>
+          <a:lstStyle/>
+          <a:p>
+            <a:r>
+              <a:rPr lang="en-US" dirty="0"/>
+              <a:t>I do not need this anymore so, I can just delete</a:t>
+            </a:r>
+          </a:p>
+        </p:txBody>
+      </p:sp>
+      <p:sp>
+        <p:nvSpPr>
+          <p:cNvPr id="12" name="Rectangle 11">
+            <a:extLst>
+              <a:ext uri="{FF2B5EF4-FFF2-40B4-BE49-F238E27FC236}">
+                <a16:creationId xmlns:a16="http://schemas.microsoft.com/office/drawing/2014/main" id="{25BD954E-1236-4134-89B6-76AF62927C15}"/>
+              </a:ext>
+            </a:extLst>
+          </p:cNvPr>
+          <p:cNvSpPr/>
+          <p:nvPr/>
+        </p:nvSpPr>
+        <p:spPr>
+          <a:xfrm>
+            <a:off x="9441180" y="5426151"/>
+            <a:ext cx="2484116" cy="1028700"/>
+          </a:xfrm>
+          <a:prstGeom prst="rect">
+            <a:avLst/>
+          </a:prstGeom>
+          <a:noFill/>
+          <a:ln>
+            <a:solidFill>
+              <a:srgbClr val="FF0000"/>
+            </a:solidFill>
+          </a:ln>
+        </p:spPr>
+        <p:style>
+          <a:lnRef idx="2">
+            <a:schemeClr val="accent1">
+              <a:shade val="50000"/>
+            </a:schemeClr>
+          </a:lnRef>
+          <a:fillRef idx="1">
+            <a:schemeClr val="accent1"/>
+          </a:fillRef>
+          <a:effectRef idx="0">
+            <a:schemeClr val="accent1"/>
+          </a:effectRef>
+          <a:fontRef idx="minor">
+            <a:schemeClr val="lt1"/>
+          </a:fontRef>
+        </p:style>
+        <p:txBody>
+          <a:bodyPr rtlCol="0" anchor="ctr"/>
+          <a:lstStyle/>
+          <a:p>
+            <a:pPr algn="ctr"/>
+            <a:endParaRPr lang="en-US"/>
+          </a:p>
+        </p:txBody>
+      </p:sp>
     </p:spTree>
     <p:extLst>
       <p:ext uri="{BB962C8B-B14F-4D97-AF65-F5344CB8AC3E}">

</xml_diff>